<commit_message>
add function for blast filter setting getting
</commit_message>
<xml_diff>
--- a/doc/scheme_and_procedure.pptx
+++ b/doc/scheme_and_procedure.pptx
@@ -289,7 +289,7 @@
           <a:p>
             <a:fld id="{FEDA596D-284E-4434-AB27-B201FA23FEAE}" type="datetimeFigureOut">
               <a:rPr lang="zh-CN" altLang="en-US" smtClean="0"/>
-              <a:t>2015/12/4</a:t>
+              <a:t>2016/1/1</a:t>
             </a:fld>
             <a:endParaRPr lang="zh-CN" altLang="en-US"/>
           </a:p>
@@ -459,7 +459,7 @@
           <a:p>
             <a:fld id="{FEDA596D-284E-4434-AB27-B201FA23FEAE}" type="datetimeFigureOut">
               <a:rPr lang="zh-CN" altLang="en-US" smtClean="0"/>
-              <a:t>2015/12/4</a:t>
+              <a:t>2016/1/1</a:t>
             </a:fld>
             <a:endParaRPr lang="zh-CN" altLang="en-US"/>
           </a:p>
@@ -639,7 +639,7 @@
           <a:p>
             <a:fld id="{FEDA596D-284E-4434-AB27-B201FA23FEAE}" type="datetimeFigureOut">
               <a:rPr lang="zh-CN" altLang="en-US" smtClean="0"/>
-              <a:t>2015/12/4</a:t>
+              <a:t>2016/1/1</a:t>
             </a:fld>
             <a:endParaRPr lang="zh-CN" altLang="en-US"/>
           </a:p>
@@ -809,7 +809,7 @@
           <a:p>
             <a:fld id="{FEDA596D-284E-4434-AB27-B201FA23FEAE}" type="datetimeFigureOut">
               <a:rPr lang="zh-CN" altLang="en-US" smtClean="0"/>
-              <a:t>2015/12/4</a:t>
+              <a:t>2016/1/1</a:t>
             </a:fld>
             <a:endParaRPr lang="zh-CN" altLang="en-US"/>
           </a:p>
@@ -1055,7 +1055,7 @@
           <a:p>
             <a:fld id="{FEDA596D-284E-4434-AB27-B201FA23FEAE}" type="datetimeFigureOut">
               <a:rPr lang="zh-CN" altLang="en-US" smtClean="0"/>
-              <a:t>2015/12/4</a:t>
+              <a:t>2016/1/1</a:t>
             </a:fld>
             <a:endParaRPr lang="zh-CN" altLang="en-US"/>
           </a:p>
@@ -1343,7 +1343,7 @@
           <a:p>
             <a:fld id="{FEDA596D-284E-4434-AB27-B201FA23FEAE}" type="datetimeFigureOut">
               <a:rPr lang="zh-CN" altLang="en-US" smtClean="0"/>
-              <a:t>2015/12/4</a:t>
+              <a:t>2016/1/1</a:t>
             </a:fld>
             <a:endParaRPr lang="zh-CN" altLang="en-US"/>
           </a:p>
@@ -1765,7 +1765,7 @@
           <a:p>
             <a:fld id="{FEDA596D-284E-4434-AB27-B201FA23FEAE}" type="datetimeFigureOut">
               <a:rPr lang="zh-CN" altLang="en-US" smtClean="0"/>
-              <a:t>2015/12/4</a:t>
+              <a:t>2016/1/1</a:t>
             </a:fld>
             <a:endParaRPr lang="zh-CN" altLang="en-US"/>
           </a:p>
@@ -1883,7 +1883,7 @@
           <a:p>
             <a:fld id="{FEDA596D-284E-4434-AB27-B201FA23FEAE}" type="datetimeFigureOut">
               <a:rPr lang="zh-CN" altLang="en-US" smtClean="0"/>
-              <a:t>2015/12/4</a:t>
+              <a:t>2016/1/1</a:t>
             </a:fld>
             <a:endParaRPr lang="zh-CN" altLang="en-US"/>
           </a:p>
@@ -1978,7 +1978,7 @@
           <a:p>
             <a:fld id="{FEDA596D-284E-4434-AB27-B201FA23FEAE}" type="datetimeFigureOut">
               <a:rPr lang="zh-CN" altLang="en-US" smtClean="0"/>
-              <a:t>2015/12/4</a:t>
+              <a:t>2016/1/1</a:t>
             </a:fld>
             <a:endParaRPr lang="zh-CN" altLang="en-US"/>
           </a:p>
@@ -2255,7 +2255,7 @@
           <a:p>
             <a:fld id="{FEDA596D-284E-4434-AB27-B201FA23FEAE}" type="datetimeFigureOut">
               <a:rPr lang="zh-CN" altLang="en-US" smtClean="0"/>
-              <a:t>2015/12/4</a:t>
+              <a:t>2016/1/1</a:t>
             </a:fld>
             <a:endParaRPr lang="zh-CN" altLang="en-US"/>
           </a:p>
@@ -2508,7 +2508,7 @@
           <a:p>
             <a:fld id="{FEDA596D-284E-4434-AB27-B201FA23FEAE}" type="datetimeFigureOut">
               <a:rPr lang="zh-CN" altLang="en-US" smtClean="0"/>
-              <a:t>2015/12/4</a:t>
+              <a:t>2016/1/1</a:t>
             </a:fld>
             <a:endParaRPr lang="zh-CN" altLang="en-US"/>
           </a:p>
@@ -2721,7 +2721,7 @@
           <a:p>
             <a:fld id="{FEDA596D-284E-4434-AB27-B201FA23FEAE}" type="datetimeFigureOut">
               <a:rPr lang="zh-CN" altLang="en-US" smtClean="0"/>
-              <a:t>2015/12/4</a:t>
+              <a:t>2016/1/1</a:t>
             </a:fld>
             <a:endParaRPr lang="zh-CN" altLang="en-US"/>
           </a:p>
@@ -3203,7 +3203,7 @@
         <p:spPr>
           <a:xfrm>
             <a:off x="2267744" y="1315788"/>
-            <a:ext cx="4605107" cy="369332"/>
+            <a:ext cx="5447645" cy="369332"/>
           </a:xfrm>
           <a:prstGeom prst="rect">
             <a:avLst/>
@@ -3234,7 +3234,19 @@
             </a:r>
             <a:r>
               <a:rPr lang="en-US" altLang="zh-CN" dirty="0" smtClean="0"/>
-              <a:t>, gaps, identity </a:t>
+              <a:t>, gaps, </a:t>
+            </a:r>
+            <a:r>
+              <a:rPr lang="en-US" altLang="zh-CN" dirty="0" smtClean="0"/>
+              <a:t>identity</a:t>
+            </a:r>
+            <a:r>
+              <a:rPr lang="en-US" altLang="zh-CN" dirty="0" smtClean="0"/>
+              <a:t>, covered</a:t>
+            </a:r>
+            <a:r>
+              <a:rPr lang="en-US" altLang="zh-CN" dirty="0" smtClean="0"/>
+              <a:t> </a:t>
             </a:r>
             <a:endParaRPr lang="zh-CN" altLang="en-US" dirty="0"/>
           </a:p>

</xml_diff>

<commit_message>
Begin pipeline for extract SNP genotype from sequence alignment
</commit_message>
<xml_diff>
--- a/doc/scheme_and_procedure.pptx
+++ b/doc/scheme_and_procedure.pptx
@@ -9,6 +9,7 @@
     <p:sldId id="257" r:id="rId3"/>
     <p:sldId id="258" r:id="rId4"/>
     <p:sldId id="259" r:id="rId5"/>
+    <p:sldId id="260" r:id="rId6"/>
   </p:sldIdLst>
   <p:sldSz cx="9144000" cy="6858000" type="screen4x3"/>
   <p:notesSz cx="6858000" cy="9144000"/>
@@ -291,7 +292,7 @@
           <a:p>
             <a:fld id="{FEDA596D-284E-4434-AB27-B201FA23FEAE}" type="datetimeFigureOut">
               <a:rPr lang="zh-CN" altLang="en-US" smtClean="0"/>
-              <a:t>2016/1/3</a:t>
+              <a:t>2016/1/30</a:t>
             </a:fld>
             <a:endParaRPr lang="zh-CN" altLang="en-US"/>
           </a:p>
@@ -461,7 +462,7 @@
           <a:p>
             <a:fld id="{FEDA596D-284E-4434-AB27-B201FA23FEAE}" type="datetimeFigureOut">
               <a:rPr lang="zh-CN" altLang="en-US" smtClean="0"/>
-              <a:t>2016/1/3</a:t>
+              <a:t>2016/1/30</a:t>
             </a:fld>
             <a:endParaRPr lang="zh-CN" altLang="en-US"/>
           </a:p>
@@ -641,7 +642,7 @@
           <a:p>
             <a:fld id="{FEDA596D-284E-4434-AB27-B201FA23FEAE}" type="datetimeFigureOut">
               <a:rPr lang="zh-CN" altLang="en-US" smtClean="0"/>
-              <a:t>2016/1/3</a:t>
+              <a:t>2016/1/30</a:t>
             </a:fld>
             <a:endParaRPr lang="zh-CN" altLang="en-US"/>
           </a:p>
@@ -811,7 +812,7 @@
           <a:p>
             <a:fld id="{FEDA596D-284E-4434-AB27-B201FA23FEAE}" type="datetimeFigureOut">
               <a:rPr lang="zh-CN" altLang="en-US" smtClean="0"/>
-              <a:t>2016/1/3</a:t>
+              <a:t>2016/1/30</a:t>
             </a:fld>
             <a:endParaRPr lang="zh-CN" altLang="en-US"/>
           </a:p>
@@ -1057,7 +1058,7 @@
           <a:p>
             <a:fld id="{FEDA596D-284E-4434-AB27-B201FA23FEAE}" type="datetimeFigureOut">
               <a:rPr lang="zh-CN" altLang="en-US" smtClean="0"/>
-              <a:t>2016/1/3</a:t>
+              <a:t>2016/1/30</a:t>
             </a:fld>
             <a:endParaRPr lang="zh-CN" altLang="en-US"/>
           </a:p>
@@ -1345,7 +1346,7 @@
           <a:p>
             <a:fld id="{FEDA596D-284E-4434-AB27-B201FA23FEAE}" type="datetimeFigureOut">
               <a:rPr lang="zh-CN" altLang="en-US" smtClean="0"/>
-              <a:t>2016/1/3</a:t>
+              <a:t>2016/1/30</a:t>
             </a:fld>
             <a:endParaRPr lang="zh-CN" altLang="en-US"/>
           </a:p>
@@ -1767,7 +1768,7 @@
           <a:p>
             <a:fld id="{FEDA596D-284E-4434-AB27-B201FA23FEAE}" type="datetimeFigureOut">
               <a:rPr lang="zh-CN" altLang="en-US" smtClean="0"/>
-              <a:t>2016/1/3</a:t>
+              <a:t>2016/1/30</a:t>
             </a:fld>
             <a:endParaRPr lang="zh-CN" altLang="en-US"/>
           </a:p>
@@ -1885,7 +1886,7 @@
           <a:p>
             <a:fld id="{FEDA596D-284E-4434-AB27-B201FA23FEAE}" type="datetimeFigureOut">
               <a:rPr lang="zh-CN" altLang="en-US" smtClean="0"/>
-              <a:t>2016/1/3</a:t>
+              <a:t>2016/1/30</a:t>
             </a:fld>
             <a:endParaRPr lang="zh-CN" altLang="en-US"/>
           </a:p>
@@ -1980,7 +1981,7 @@
           <a:p>
             <a:fld id="{FEDA596D-284E-4434-AB27-B201FA23FEAE}" type="datetimeFigureOut">
               <a:rPr lang="zh-CN" altLang="en-US" smtClean="0"/>
-              <a:t>2016/1/3</a:t>
+              <a:t>2016/1/30</a:t>
             </a:fld>
             <a:endParaRPr lang="zh-CN" altLang="en-US"/>
           </a:p>
@@ -2257,7 +2258,7 @@
           <a:p>
             <a:fld id="{FEDA596D-284E-4434-AB27-B201FA23FEAE}" type="datetimeFigureOut">
               <a:rPr lang="zh-CN" altLang="en-US" smtClean="0"/>
-              <a:t>2016/1/3</a:t>
+              <a:t>2016/1/30</a:t>
             </a:fld>
             <a:endParaRPr lang="zh-CN" altLang="en-US"/>
           </a:p>
@@ -2510,7 +2511,7 @@
           <a:p>
             <a:fld id="{FEDA596D-284E-4434-AB27-B201FA23FEAE}" type="datetimeFigureOut">
               <a:rPr lang="zh-CN" altLang="en-US" smtClean="0"/>
-              <a:t>2016/1/3</a:t>
+              <a:t>2016/1/30</a:t>
             </a:fld>
             <a:endParaRPr lang="zh-CN" altLang="en-US"/>
           </a:p>
@@ -2723,7 +2724,7 @@
           <a:p>
             <a:fld id="{FEDA596D-284E-4434-AB27-B201FA23FEAE}" type="datetimeFigureOut">
               <a:rPr lang="zh-CN" altLang="en-US" smtClean="0"/>
-              <a:t>2016/1/3</a:t>
+              <a:t>2016/1/30</a:t>
             </a:fld>
             <a:endParaRPr lang="zh-CN" altLang="en-US"/>
           </a:p>
@@ -4916,6 +4917,148 @@
     <p:extLst>
       <p:ext uri="{BB962C8B-B14F-4D97-AF65-F5344CB8AC3E}">
         <p14:creationId xmlns:p14="http://schemas.microsoft.com/office/powerpoint/2010/main" val="4136356047"/>
+      </p:ext>
+    </p:extLst>
+  </p:cSld>
+  <p:clrMapOvr>
+    <a:masterClrMapping/>
+  </p:clrMapOvr>
+</p:sld>
+</file>
+
+<file path=ppt/slides/slide5.xml><?xml version="1.0" encoding="utf-8"?>
+<p:sld xmlns:a="http://schemas.openxmlformats.org/drawingml/2006/main" xmlns:r="http://schemas.openxmlformats.org/officeDocument/2006/relationships" xmlns:p="http://schemas.openxmlformats.org/presentationml/2006/main">
+  <p:cSld>
+    <p:spTree>
+      <p:nvGrpSpPr>
+        <p:cNvPr id="1" name=""/>
+        <p:cNvGrpSpPr/>
+        <p:nvPr/>
+      </p:nvGrpSpPr>
+      <p:grpSpPr>
+        <a:xfrm>
+          <a:off x="0" y="0"/>
+          <a:ext cx="0" cy="0"/>
+          <a:chOff x="0" y="0"/>
+          <a:chExt cx="0" cy="0"/>
+        </a:xfrm>
+      </p:grpSpPr>
+      <p:sp>
+        <p:nvSpPr>
+          <p:cNvPr id="2" name="标题 1"/>
+          <p:cNvSpPr>
+            <a:spLocks noGrp="1"/>
+          </p:cNvSpPr>
+          <p:nvPr>
+            <p:ph type="title"/>
+          </p:nvPr>
+        </p:nvSpPr>
+        <p:spPr/>
+        <p:txBody>
+          <a:bodyPr/>
+          <a:lstStyle/>
+          <a:p>
+            <a:r>
+              <a:rPr lang="en-US" altLang="zh-CN" dirty="0" smtClean="0"/>
+              <a:t>For </a:t>
+            </a:r>
+            <a:r>
+              <a:rPr lang="en-US" altLang="zh-CN" dirty="0" err="1" smtClean="0"/>
+              <a:t>Tianyihuiyuan</a:t>
+            </a:r>
+            <a:endParaRPr lang="zh-CN" altLang="en-US" dirty="0"/>
+          </a:p>
+        </p:txBody>
+      </p:sp>
+      <p:sp>
+        <p:nvSpPr>
+          <p:cNvPr id="3" name="内容占位符 2"/>
+          <p:cNvSpPr>
+            <a:spLocks noGrp="1"/>
+          </p:cNvSpPr>
+          <p:nvPr>
+            <p:ph idx="1"/>
+          </p:nvPr>
+        </p:nvSpPr>
+        <p:spPr/>
+        <p:txBody>
+          <a:bodyPr/>
+          <a:lstStyle/>
+          <a:p>
+            <a:r>
+              <a:rPr lang="en-US" altLang="zh-CN" dirty="0" smtClean="0"/>
+              <a:t>Begin with SNP/</a:t>
+            </a:r>
+            <a:r>
+              <a:rPr lang="en-US" altLang="zh-CN" dirty="0" err="1" smtClean="0"/>
+              <a:t>Indel</a:t>
+            </a:r>
+            <a:r>
+              <a:rPr lang="en-US" altLang="zh-CN" dirty="0" smtClean="0"/>
+              <a:t> position, and reference sequence</a:t>
+            </a:r>
+          </a:p>
+          <a:p>
+            <a:pPr marL="0" indent="0">
+              <a:buNone/>
+            </a:pPr>
+            <a:r>
+              <a:rPr lang="en-US" altLang="zh-CN" dirty="0" smtClean="0"/>
+              <a:t>SNP/</a:t>
+            </a:r>
+            <a:r>
+              <a:rPr lang="en-US" altLang="zh-CN" dirty="0" err="1" smtClean="0"/>
+              <a:t>Indel</a:t>
+            </a:r>
+            <a:r>
+              <a:rPr lang="en-US" altLang="zh-CN" dirty="0" smtClean="0"/>
+              <a:t>: </a:t>
+            </a:r>
+            <a:r>
+              <a:rPr lang="en-US" altLang="zh-CN" dirty="0" err="1" smtClean="0"/>
+              <a:t>vcf</a:t>
+            </a:r>
+            <a:r>
+              <a:rPr lang="en-US" altLang="zh-CN" dirty="0" smtClean="0"/>
+              <a:t>, bed, or other format</a:t>
+            </a:r>
+          </a:p>
+          <a:p>
+            <a:pPr marL="0" indent="0">
+              <a:buNone/>
+            </a:pPr>
+            <a:r>
+              <a:rPr lang="en-US" altLang="zh-CN" dirty="0"/>
+              <a:t>r</a:t>
+            </a:r>
+            <a:r>
+              <a:rPr lang="en-US" altLang="zh-CN" dirty="0" smtClean="0"/>
+              <a:t>eference: </a:t>
+            </a:r>
+            <a:r>
+              <a:rPr lang="en-US" altLang="zh-CN" dirty="0" err="1" smtClean="0"/>
+              <a:t>url</a:t>
+            </a:r>
+            <a:r>
+              <a:rPr lang="en-US" altLang="zh-CN" dirty="0" smtClean="0"/>
+              <a:t>, organisms, or </a:t>
+            </a:r>
+            <a:r>
+              <a:rPr lang="en-US" altLang="zh-CN" dirty="0" err="1" smtClean="0"/>
+              <a:t>fasta</a:t>
+            </a:r>
+            <a:r>
+              <a:rPr lang="en-US" altLang="zh-CN" smtClean="0"/>
+              <a:t> sequence </a:t>
+            </a:r>
+            <a:endParaRPr lang="zh-CN" altLang="en-US" dirty="0"/>
+          </a:p>
+        </p:txBody>
+      </p:sp>
+    </p:spTree>
+    <p:extLst>
+      <p:ext uri="{BB962C8B-B14F-4D97-AF65-F5344CB8AC3E}">
+        <p14:creationId xmlns:p14="http://schemas.microsoft.com/office/powerpoint/2010/main" val="1389773394"/>
       </p:ext>
     </p:extLst>
   </p:cSld>

</xml_diff>

<commit_message>
finished workflow for EMView v 0.01
</commit_message>
<xml_diff>
--- a/doc/scheme_and_procedure.pptx
+++ b/doc/scheme_and_procedure.pptx
@@ -10,6 +10,7 @@
     <p:sldId id="258" r:id="rId4"/>
     <p:sldId id="259" r:id="rId5"/>
     <p:sldId id="260" r:id="rId6"/>
+    <p:sldId id="261" r:id="rId7"/>
   </p:sldIdLst>
   <p:sldSz cx="9144000" cy="6858000" type="screen4x3"/>
   <p:notesSz cx="6858000" cy="9144000"/>
@@ -292,7 +293,7 @@
           <a:p>
             <a:fld id="{FEDA596D-284E-4434-AB27-B201FA23FEAE}" type="datetimeFigureOut">
               <a:rPr lang="zh-CN" altLang="en-US" smtClean="0"/>
-              <a:t>2016/1/30</a:t>
+              <a:t>2016/3/28</a:t>
             </a:fld>
             <a:endParaRPr lang="zh-CN" altLang="en-US"/>
           </a:p>
@@ -462,7 +463,7 @@
           <a:p>
             <a:fld id="{FEDA596D-284E-4434-AB27-B201FA23FEAE}" type="datetimeFigureOut">
               <a:rPr lang="zh-CN" altLang="en-US" smtClean="0"/>
-              <a:t>2016/1/30</a:t>
+              <a:t>2016/3/28</a:t>
             </a:fld>
             <a:endParaRPr lang="zh-CN" altLang="en-US"/>
           </a:p>
@@ -642,7 +643,7 @@
           <a:p>
             <a:fld id="{FEDA596D-284E-4434-AB27-B201FA23FEAE}" type="datetimeFigureOut">
               <a:rPr lang="zh-CN" altLang="en-US" smtClean="0"/>
-              <a:t>2016/1/30</a:t>
+              <a:t>2016/3/28</a:t>
             </a:fld>
             <a:endParaRPr lang="zh-CN" altLang="en-US"/>
           </a:p>
@@ -812,7 +813,7 @@
           <a:p>
             <a:fld id="{FEDA596D-284E-4434-AB27-B201FA23FEAE}" type="datetimeFigureOut">
               <a:rPr lang="zh-CN" altLang="en-US" smtClean="0"/>
-              <a:t>2016/1/30</a:t>
+              <a:t>2016/3/28</a:t>
             </a:fld>
             <a:endParaRPr lang="zh-CN" altLang="en-US"/>
           </a:p>
@@ -1058,7 +1059,7 @@
           <a:p>
             <a:fld id="{FEDA596D-284E-4434-AB27-B201FA23FEAE}" type="datetimeFigureOut">
               <a:rPr lang="zh-CN" altLang="en-US" smtClean="0"/>
-              <a:t>2016/1/30</a:t>
+              <a:t>2016/3/28</a:t>
             </a:fld>
             <a:endParaRPr lang="zh-CN" altLang="en-US"/>
           </a:p>
@@ -1346,7 +1347,7 @@
           <a:p>
             <a:fld id="{FEDA596D-284E-4434-AB27-B201FA23FEAE}" type="datetimeFigureOut">
               <a:rPr lang="zh-CN" altLang="en-US" smtClean="0"/>
-              <a:t>2016/1/30</a:t>
+              <a:t>2016/3/28</a:t>
             </a:fld>
             <a:endParaRPr lang="zh-CN" altLang="en-US"/>
           </a:p>
@@ -1768,7 +1769,7 @@
           <a:p>
             <a:fld id="{FEDA596D-284E-4434-AB27-B201FA23FEAE}" type="datetimeFigureOut">
               <a:rPr lang="zh-CN" altLang="en-US" smtClean="0"/>
-              <a:t>2016/1/30</a:t>
+              <a:t>2016/3/28</a:t>
             </a:fld>
             <a:endParaRPr lang="zh-CN" altLang="en-US"/>
           </a:p>
@@ -1886,7 +1887,7 @@
           <a:p>
             <a:fld id="{FEDA596D-284E-4434-AB27-B201FA23FEAE}" type="datetimeFigureOut">
               <a:rPr lang="zh-CN" altLang="en-US" smtClean="0"/>
-              <a:t>2016/1/30</a:t>
+              <a:t>2016/3/28</a:t>
             </a:fld>
             <a:endParaRPr lang="zh-CN" altLang="en-US"/>
           </a:p>
@@ -1981,7 +1982,7 @@
           <a:p>
             <a:fld id="{FEDA596D-284E-4434-AB27-B201FA23FEAE}" type="datetimeFigureOut">
               <a:rPr lang="zh-CN" altLang="en-US" smtClean="0"/>
-              <a:t>2016/1/30</a:t>
+              <a:t>2016/3/28</a:t>
             </a:fld>
             <a:endParaRPr lang="zh-CN" altLang="en-US"/>
           </a:p>
@@ -2258,7 +2259,7 @@
           <a:p>
             <a:fld id="{FEDA596D-284E-4434-AB27-B201FA23FEAE}" type="datetimeFigureOut">
               <a:rPr lang="zh-CN" altLang="en-US" smtClean="0"/>
-              <a:t>2016/1/30</a:t>
+              <a:t>2016/3/28</a:t>
             </a:fld>
             <a:endParaRPr lang="zh-CN" altLang="en-US"/>
           </a:p>
@@ -2511,7 +2512,7 @@
           <a:p>
             <a:fld id="{FEDA596D-284E-4434-AB27-B201FA23FEAE}" type="datetimeFigureOut">
               <a:rPr lang="zh-CN" altLang="en-US" smtClean="0"/>
-              <a:t>2016/1/30</a:t>
+              <a:t>2016/3/28</a:t>
             </a:fld>
             <a:endParaRPr lang="zh-CN" altLang="en-US"/>
           </a:p>
@@ -2724,7 +2725,7 @@
           <a:p>
             <a:fld id="{FEDA596D-284E-4434-AB27-B201FA23FEAE}" type="datetimeFigureOut">
               <a:rPr lang="zh-CN" altLang="en-US" smtClean="0"/>
-              <a:t>2016/1/30</a:t>
+              <a:t>2016/3/28</a:t>
             </a:fld>
             <a:endParaRPr lang="zh-CN" altLang="en-US"/>
           </a:p>
@@ -5059,6 +5060,1336 @@
     <p:extLst>
       <p:ext uri="{BB962C8B-B14F-4D97-AF65-F5344CB8AC3E}">
         <p14:creationId xmlns:p14="http://schemas.microsoft.com/office/powerpoint/2010/main" val="1389773394"/>
+      </p:ext>
+    </p:extLst>
+  </p:cSld>
+  <p:clrMapOvr>
+    <a:masterClrMapping/>
+  </p:clrMapOvr>
+</p:sld>
+</file>
+
+<file path=ppt/slides/slide6.xml><?xml version="1.0" encoding="utf-8"?>
+<p:sld xmlns:a="http://schemas.openxmlformats.org/drawingml/2006/main" xmlns:r="http://schemas.openxmlformats.org/officeDocument/2006/relationships" xmlns:p="http://schemas.openxmlformats.org/presentationml/2006/main">
+  <p:cSld>
+    <p:spTree>
+      <p:nvGrpSpPr>
+        <p:cNvPr id="1" name=""/>
+        <p:cNvGrpSpPr/>
+        <p:nvPr/>
+      </p:nvGrpSpPr>
+      <p:grpSpPr>
+        <a:xfrm>
+          <a:off x="0" y="0"/>
+          <a:ext cx="0" cy="0"/>
+          <a:chOff x="0" y="0"/>
+          <a:chExt cx="0" cy="0"/>
+        </a:xfrm>
+      </p:grpSpPr>
+      <p:sp>
+        <p:nvSpPr>
+          <p:cNvPr id="2" name="标题 1"/>
+          <p:cNvSpPr>
+            <a:spLocks noGrp="1"/>
+          </p:cNvSpPr>
+          <p:nvPr>
+            <p:ph type="title"/>
+          </p:nvPr>
+        </p:nvSpPr>
+        <p:spPr/>
+        <p:txBody>
+          <a:bodyPr/>
+          <a:lstStyle/>
+          <a:p>
+            <a:r>
+              <a:rPr lang="en-US" altLang="zh-CN" dirty="0" smtClean="0"/>
+              <a:t>Workflow for </a:t>
+            </a:r>
+            <a:r>
+              <a:rPr lang="en-US" altLang="zh-CN" dirty="0" err="1" smtClean="0"/>
+              <a:t>EMview</a:t>
+            </a:r>
+            <a:endParaRPr lang="zh-CN" altLang="en-US" dirty="0"/>
+          </a:p>
+        </p:txBody>
+      </p:sp>
+      <p:sp>
+        <p:nvSpPr>
+          <p:cNvPr id="32" name="TextBox 31"/>
+          <p:cNvSpPr txBox="1"/>
+          <p:nvPr/>
+        </p:nvSpPr>
+        <p:spPr>
+          <a:xfrm>
+            <a:off x="5580112" y="1844824"/>
+            <a:ext cx="3105850" cy="369332"/>
+          </a:xfrm>
+          <a:prstGeom prst="rect">
+            <a:avLst/>
+          </a:prstGeom>
+          <a:noFill/>
+        </p:spPr>
+        <p:txBody>
+          <a:bodyPr wrap="none" rtlCol="0">
+            <a:spAutoFit/>
+          </a:bodyPr>
+          <a:lstStyle/>
+          <a:p>
+            <a:r>
+              <a:rPr lang="en-US" altLang="zh-CN" dirty="0" smtClean="0"/>
+              <a:t>STR: Sequencing Target Region </a:t>
+            </a:r>
+            <a:endParaRPr lang="zh-CN" altLang="en-US" dirty="0"/>
+          </a:p>
+        </p:txBody>
+      </p:sp>
+      <p:sp>
+        <p:nvSpPr>
+          <p:cNvPr id="33" name="TextBox 32"/>
+          <p:cNvSpPr txBox="1"/>
+          <p:nvPr/>
+        </p:nvSpPr>
+        <p:spPr>
+          <a:xfrm>
+            <a:off x="5732512" y="2430180"/>
+            <a:ext cx="2600840" cy="369332"/>
+          </a:xfrm>
+          <a:prstGeom prst="rect">
+            <a:avLst/>
+          </a:prstGeom>
+          <a:noFill/>
+        </p:spPr>
+        <p:txBody>
+          <a:bodyPr wrap="none" rtlCol="0">
+            <a:spAutoFit/>
+          </a:bodyPr>
+          <a:lstStyle/>
+          <a:p>
+            <a:r>
+              <a:rPr lang="en-US" altLang="zh-CN" dirty="0" smtClean="0"/>
+              <a:t>TBL: table format of blast </a:t>
+            </a:r>
+            <a:endParaRPr lang="zh-CN" altLang="en-US" dirty="0"/>
+          </a:p>
+        </p:txBody>
+      </p:sp>
+      <p:sp>
+        <p:nvSpPr>
+          <p:cNvPr id="34" name="TextBox 33"/>
+          <p:cNvSpPr txBox="1"/>
+          <p:nvPr/>
+        </p:nvSpPr>
+        <p:spPr>
+          <a:xfrm>
+            <a:off x="5652120" y="3212976"/>
+            <a:ext cx="3475375" cy="369332"/>
+          </a:xfrm>
+          <a:prstGeom prst="rect">
+            <a:avLst/>
+          </a:prstGeom>
+          <a:noFill/>
+        </p:spPr>
+        <p:txBody>
+          <a:bodyPr wrap="none" rtlCol="0">
+            <a:spAutoFit/>
+          </a:bodyPr>
+          <a:lstStyle/>
+          <a:p>
+            <a:r>
+              <a:rPr lang="en-US" altLang="zh-CN" dirty="0" smtClean="0"/>
+              <a:t>FTBL: Filtered table format of blast </a:t>
+            </a:r>
+            <a:endParaRPr lang="zh-CN" altLang="en-US" dirty="0"/>
+          </a:p>
+        </p:txBody>
+      </p:sp>
+      <p:grpSp>
+        <p:nvGrpSpPr>
+          <p:cNvPr id="72" name="组合 71"/>
+          <p:cNvGrpSpPr/>
+          <p:nvPr/>
+        </p:nvGrpSpPr>
+        <p:grpSpPr>
+          <a:xfrm>
+            <a:off x="341634" y="1700808"/>
+            <a:ext cx="3858344" cy="4721170"/>
+            <a:chOff x="341634" y="1700808"/>
+            <a:chExt cx="3858344" cy="4721170"/>
+          </a:xfrm>
+        </p:grpSpPr>
+        <p:sp>
+          <p:nvSpPr>
+            <p:cNvPr id="6" name="TextBox 5"/>
+            <p:cNvSpPr txBox="1"/>
+            <p:nvPr/>
+          </p:nvSpPr>
+          <p:spPr>
+            <a:xfrm>
+              <a:off x="2087516" y="1700808"/>
+              <a:ext cx="559769" cy="369332"/>
+            </a:xfrm>
+            <a:prstGeom prst="rect">
+              <a:avLst/>
+            </a:prstGeom>
+            <a:noFill/>
+          </p:spPr>
+          <p:txBody>
+            <a:bodyPr wrap="none" rtlCol="0">
+              <a:spAutoFit/>
+            </a:bodyPr>
+            <a:lstStyle/>
+            <a:p>
+              <a:r>
+                <a:rPr lang="en-US" altLang="zh-CN" dirty="0" smtClean="0"/>
+                <a:t>AB1</a:t>
+              </a:r>
+              <a:endParaRPr lang="zh-CN" altLang="en-US" dirty="0"/>
+            </a:p>
+          </p:txBody>
+        </p:sp>
+        <p:sp>
+          <p:nvSpPr>
+            <p:cNvPr id="7" name="TextBox 6"/>
+            <p:cNvSpPr txBox="1"/>
+            <p:nvPr/>
+          </p:nvSpPr>
+          <p:spPr>
+            <a:xfrm>
+              <a:off x="2033006" y="2483604"/>
+              <a:ext cx="666786" cy="369332"/>
+            </a:xfrm>
+            <a:prstGeom prst="rect">
+              <a:avLst/>
+            </a:prstGeom>
+            <a:noFill/>
+          </p:spPr>
+          <p:txBody>
+            <a:bodyPr wrap="none" rtlCol="0">
+              <a:spAutoFit/>
+            </a:bodyPr>
+            <a:lstStyle/>
+            <a:p>
+              <a:r>
+                <a:rPr lang="en-US" altLang="zh-CN" dirty="0" err="1" smtClean="0"/>
+                <a:t>Fasta</a:t>
+              </a:r>
+              <a:endParaRPr lang="zh-CN" altLang="en-US" dirty="0"/>
+            </a:p>
+          </p:txBody>
+        </p:sp>
+        <p:sp>
+          <p:nvSpPr>
+            <p:cNvPr id="8" name="TextBox 7"/>
+            <p:cNvSpPr txBox="1"/>
+            <p:nvPr/>
+          </p:nvSpPr>
+          <p:spPr>
+            <a:xfrm>
+              <a:off x="2106552" y="3347700"/>
+              <a:ext cx="519694" cy="369332"/>
+            </a:xfrm>
+            <a:prstGeom prst="rect">
+              <a:avLst/>
+            </a:prstGeom>
+            <a:noFill/>
+          </p:spPr>
+          <p:txBody>
+            <a:bodyPr wrap="none" rtlCol="0">
+              <a:spAutoFit/>
+            </a:bodyPr>
+            <a:lstStyle/>
+            <a:p>
+              <a:r>
+                <a:rPr lang="en-US" altLang="zh-CN" dirty="0" smtClean="0"/>
+                <a:t>TBL</a:t>
+              </a:r>
+              <a:endParaRPr lang="zh-CN" altLang="en-US" dirty="0"/>
+            </a:p>
+          </p:txBody>
+        </p:sp>
+        <p:sp>
+          <p:nvSpPr>
+            <p:cNvPr id="9" name="TextBox 8"/>
+            <p:cNvSpPr txBox="1"/>
+            <p:nvPr/>
+          </p:nvSpPr>
+          <p:spPr>
+            <a:xfrm>
+              <a:off x="3059832" y="2915652"/>
+              <a:ext cx="1082925" cy="369332"/>
+            </a:xfrm>
+            <a:prstGeom prst="rect">
+              <a:avLst/>
+            </a:prstGeom>
+            <a:noFill/>
+          </p:spPr>
+          <p:txBody>
+            <a:bodyPr wrap="none" rtlCol="0">
+              <a:spAutoFit/>
+            </a:bodyPr>
+            <a:lstStyle/>
+            <a:p>
+              <a:r>
+                <a:rPr lang="en-US" altLang="zh-CN" dirty="0" smtClean="0"/>
+                <a:t>reference</a:t>
+              </a:r>
+              <a:endParaRPr lang="zh-CN" altLang="en-US" dirty="0"/>
+            </a:p>
+          </p:txBody>
+        </p:sp>
+        <p:sp>
+          <p:nvSpPr>
+            <p:cNvPr id="10" name="TextBox 9"/>
+            <p:cNvSpPr txBox="1"/>
+            <p:nvPr/>
+          </p:nvSpPr>
+          <p:spPr>
+            <a:xfrm>
+              <a:off x="2054655" y="4442612"/>
+              <a:ext cx="625492" cy="369332"/>
+            </a:xfrm>
+            <a:prstGeom prst="rect">
+              <a:avLst/>
+            </a:prstGeom>
+            <a:noFill/>
+          </p:spPr>
+          <p:txBody>
+            <a:bodyPr wrap="none" rtlCol="0">
+              <a:spAutoFit/>
+            </a:bodyPr>
+            <a:lstStyle/>
+            <a:p>
+              <a:r>
+                <a:rPr lang="en-US" altLang="zh-CN" dirty="0" smtClean="0"/>
+                <a:t>FTBL</a:t>
+              </a:r>
+              <a:endParaRPr lang="zh-CN" altLang="en-US" dirty="0"/>
+            </a:p>
+          </p:txBody>
+        </p:sp>
+        <p:sp>
+          <p:nvSpPr>
+            <p:cNvPr id="11" name="TextBox 10"/>
+            <p:cNvSpPr txBox="1"/>
+            <p:nvPr/>
+          </p:nvSpPr>
+          <p:spPr>
+            <a:xfrm>
+              <a:off x="3059832" y="3923764"/>
+              <a:ext cx="526106" cy="369332"/>
+            </a:xfrm>
+            <a:prstGeom prst="rect">
+              <a:avLst/>
+            </a:prstGeom>
+            <a:noFill/>
+          </p:spPr>
+          <p:txBody>
+            <a:bodyPr wrap="none" rtlCol="0">
+              <a:spAutoFit/>
+            </a:bodyPr>
+            <a:lstStyle/>
+            <a:p>
+              <a:r>
+                <a:rPr lang="en-US" altLang="zh-CN" dirty="0" smtClean="0"/>
+                <a:t>STR</a:t>
+              </a:r>
+              <a:endParaRPr lang="zh-CN" altLang="en-US" dirty="0"/>
+            </a:p>
+          </p:txBody>
+        </p:sp>
+        <p:sp>
+          <p:nvSpPr>
+            <p:cNvPr id="12" name="TextBox 11"/>
+            <p:cNvSpPr txBox="1"/>
+            <p:nvPr/>
+          </p:nvSpPr>
+          <p:spPr>
+            <a:xfrm>
+              <a:off x="3135365" y="4871910"/>
+              <a:ext cx="931858" cy="369332"/>
+            </a:xfrm>
+            <a:prstGeom prst="rect">
+              <a:avLst/>
+            </a:prstGeom>
+            <a:noFill/>
+          </p:spPr>
+          <p:txBody>
+            <a:bodyPr wrap="none" rtlCol="0">
+              <a:spAutoFit/>
+            </a:bodyPr>
+            <a:lstStyle/>
+            <a:p>
+              <a:r>
+                <a:rPr lang="en-US" altLang="zh-CN" dirty="0" err="1" smtClean="0"/>
+                <a:t>SNVinfo</a:t>
+              </a:r>
+              <a:endParaRPr lang="zh-CN" altLang="en-US" dirty="0"/>
+            </a:p>
+          </p:txBody>
+        </p:sp>
+        <p:sp>
+          <p:nvSpPr>
+            <p:cNvPr id="13" name="TextBox 12"/>
+            <p:cNvSpPr txBox="1"/>
+            <p:nvPr/>
+          </p:nvSpPr>
+          <p:spPr>
+            <a:xfrm>
+              <a:off x="1259632" y="5301208"/>
+              <a:ext cx="930511" cy="369332"/>
+            </a:xfrm>
+            <a:prstGeom prst="rect">
+              <a:avLst/>
+            </a:prstGeom>
+            <a:noFill/>
+          </p:spPr>
+          <p:txBody>
+            <a:bodyPr wrap="none" rtlCol="0">
+              <a:spAutoFit/>
+            </a:bodyPr>
+            <a:lstStyle/>
+            <a:p>
+              <a:r>
+                <a:rPr lang="en-US" altLang="zh-CN" dirty="0" err="1" smtClean="0"/>
+                <a:t>EMview</a:t>
+              </a:r>
+              <a:endParaRPr lang="zh-CN" altLang="en-US" dirty="0"/>
+            </a:p>
+          </p:txBody>
+        </p:sp>
+        <p:sp>
+          <p:nvSpPr>
+            <p:cNvPr id="14" name="TextBox 13"/>
+            <p:cNvSpPr txBox="1"/>
+            <p:nvPr/>
+          </p:nvSpPr>
+          <p:spPr>
+            <a:xfrm>
+              <a:off x="2489361" y="5301208"/>
+              <a:ext cx="940386" cy="369332"/>
+            </a:xfrm>
+            <a:prstGeom prst="rect">
+              <a:avLst/>
+            </a:prstGeom>
+            <a:noFill/>
+          </p:spPr>
+          <p:txBody>
+            <a:bodyPr wrap="none" rtlCol="0">
+              <a:spAutoFit/>
+            </a:bodyPr>
+            <a:lstStyle/>
+            <a:p>
+              <a:r>
+                <a:rPr lang="en-US" altLang="zh-CN" dirty="0" err="1" smtClean="0"/>
+                <a:t>SNVExtr</a:t>
+              </a:r>
+              <a:endParaRPr lang="zh-CN" altLang="en-US" dirty="0"/>
+            </a:p>
+          </p:txBody>
+        </p:sp>
+        <p:sp>
+          <p:nvSpPr>
+            <p:cNvPr id="15" name="TextBox 14"/>
+            <p:cNvSpPr txBox="1"/>
+            <p:nvPr/>
+          </p:nvSpPr>
+          <p:spPr>
+            <a:xfrm>
+              <a:off x="1014083" y="6052646"/>
+              <a:ext cx="1421608" cy="369332"/>
+            </a:xfrm>
+            <a:prstGeom prst="rect">
+              <a:avLst/>
+            </a:prstGeom>
+            <a:noFill/>
+          </p:spPr>
+          <p:txBody>
+            <a:bodyPr wrap="none" rtlCol="0">
+              <a:spAutoFit/>
+            </a:bodyPr>
+            <a:lstStyle/>
+            <a:p>
+              <a:r>
+                <a:rPr lang="en-US" altLang="zh-CN" dirty="0" smtClean="0"/>
+                <a:t>Other format</a:t>
+              </a:r>
+              <a:endParaRPr lang="zh-CN" altLang="en-US" dirty="0"/>
+            </a:p>
+          </p:txBody>
+        </p:sp>
+        <p:cxnSp>
+          <p:nvCxnSpPr>
+            <p:cNvPr id="17" name="直接箭头连接符 16"/>
+            <p:cNvCxnSpPr>
+              <a:stCxn id="6" idx="2"/>
+              <a:endCxn id="7" idx="0"/>
+            </p:cNvCxnSpPr>
+            <p:nvPr/>
+          </p:nvCxnSpPr>
+          <p:spPr>
+            <a:xfrm flipH="1">
+              <a:off x="2366399" y="2070140"/>
+              <a:ext cx="1002" cy="413464"/>
+            </a:xfrm>
+            <a:prstGeom prst="straightConnector1">
+              <a:avLst/>
+            </a:prstGeom>
+            <a:ln>
+              <a:tailEnd type="arrow"/>
+            </a:ln>
+          </p:spPr>
+          <p:style>
+            <a:lnRef idx="1">
+              <a:schemeClr val="accent1"/>
+            </a:lnRef>
+            <a:fillRef idx="0">
+              <a:schemeClr val="accent1"/>
+            </a:fillRef>
+            <a:effectRef idx="0">
+              <a:schemeClr val="accent1"/>
+            </a:effectRef>
+            <a:fontRef idx="minor">
+              <a:schemeClr val="tx1"/>
+            </a:fontRef>
+          </p:style>
+        </p:cxnSp>
+        <p:sp>
+          <p:nvSpPr>
+            <p:cNvPr id="18" name="TextBox 17"/>
+            <p:cNvSpPr txBox="1"/>
+            <p:nvPr/>
+          </p:nvSpPr>
+          <p:spPr>
+            <a:xfrm>
+              <a:off x="971600" y="2070140"/>
+              <a:ext cx="864724" cy="369332"/>
+            </a:xfrm>
+            <a:prstGeom prst="rect">
+              <a:avLst/>
+            </a:prstGeom>
+            <a:noFill/>
+          </p:spPr>
+          <p:txBody>
+            <a:bodyPr wrap="none" rtlCol="0">
+              <a:spAutoFit/>
+            </a:bodyPr>
+            <a:lstStyle/>
+            <a:p>
+              <a:r>
+                <a:rPr lang="en-US" altLang="zh-CN" dirty="0" err="1" smtClean="0">
+                  <a:solidFill>
+                    <a:srgbClr val="FF0000"/>
+                  </a:solidFill>
+                </a:rPr>
+                <a:t>GetSeq</a:t>
+              </a:r>
+              <a:endParaRPr lang="zh-CN" altLang="en-US" dirty="0">
+                <a:solidFill>
+                  <a:srgbClr val="FF0000"/>
+                </a:solidFill>
+              </a:endParaRPr>
+            </a:p>
+          </p:txBody>
+        </p:sp>
+        <p:cxnSp>
+          <p:nvCxnSpPr>
+            <p:cNvPr id="20" name="直接箭头连接符 19"/>
+            <p:cNvCxnSpPr>
+              <a:stCxn id="7" idx="2"/>
+              <a:endCxn id="8" idx="0"/>
+            </p:cNvCxnSpPr>
+            <p:nvPr/>
+          </p:nvCxnSpPr>
+          <p:spPr>
+            <a:xfrm>
+              <a:off x="2366399" y="2852936"/>
+              <a:ext cx="0" cy="494764"/>
+            </a:xfrm>
+            <a:prstGeom prst="straightConnector1">
+              <a:avLst/>
+            </a:prstGeom>
+            <a:ln>
+              <a:tailEnd type="arrow"/>
+            </a:ln>
+          </p:spPr>
+          <p:style>
+            <a:lnRef idx="1">
+              <a:schemeClr val="accent1"/>
+            </a:lnRef>
+            <a:fillRef idx="0">
+              <a:schemeClr val="accent1"/>
+            </a:fillRef>
+            <a:effectRef idx="0">
+              <a:schemeClr val="accent1"/>
+            </a:effectRef>
+            <a:fontRef idx="minor">
+              <a:schemeClr val="tx1"/>
+            </a:fontRef>
+          </p:style>
+        </p:cxnSp>
+        <p:cxnSp>
+          <p:nvCxnSpPr>
+            <p:cNvPr id="23" name="直接箭头连接符 22"/>
+            <p:cNvCxnSpPr>
+              <a:stCxn id="9" idx="1"/>
+            </p:cNvCxnSpPr>
+            <p:nvPr/>
+          </p:nvCxnSpPr>
+          <p:spPr>
+            <a:xfrm flipH="1">
+              <a:off x="2414844" y="3100318"/>
+              <a:ext cx="644988" cy="0"/>
+            </a:xfrm>
+            <a:prstGeom prst="straightConnector1">
+              <a:avLst/>
+            </a:prstGeom>
+            <a:ln>
+              <a:tailEnd type="arrow"/>
+            </a:ln>
+          </p:spPr>
+          <p:style>
+            <a:lnRef idx="1">
+              <a:schemeClr val="accent1"/>
+            </a:lnRef>
+            <a:fillRef idx="0">
+              <a:schemeClr val="accent1"/>
+            </a:fillRef>
+            <a:effectRef idx="0">
+              <a:schemeClr val="accent1"/>
+            </a:effectRef>
+            <a:fontRef idx="minor">
+              <a:schemeClr val="tx1"/>
+            </a:fontRef>
+          </p:style>
+        </p:cxnSp>
+        <p:cxnSp>
+          <p:nvCxnSpPr>
+            <p:cNvPr id="25" name="直接箭头连接符 24"/>
+            <p:cNvCxnSpPr>
+              <a:stCxn id="18" idx="3"/>
+            </p:cNvCxnSpPr>
+            <p:nvPr/>
+          </p:nvCxnSpPr>
+          <p:spPr>
+            <a:xfrm>
+              <a:off x="1836324" y="2254806"/>
+              <a:ext cx="530075" cy="0"/>
+            </a:xfrm>
+            <a:prstGeom prst="straightConnector1">
+              <a:avLst/>
+            </a:prstGeom>
+            <a:ln>
+              <a:tailEnd type="arrow"/>
+            </a:ln>
+          </p:spPr>
+          <p:style>
+            <a:lnRef idx="1">
+              <a:schemeClr val="accent1"/>
+            </a:lnRef>
+            <a:fillRef idx="0">
+              <a:schemeClr val="accent1"/>
+            </a:fillRef>
+            <a:effectRef idx="0">
+              <a:schemeClr val="accent1"/>
+            </a:effectRef>
+            <a:fontRef idx="minor">
+              <a:schemeClr val="tx1"/>
+            </a:fontRef>
+          </p:style>
+        </p:cxnSp>
+        <p:sp>
+          <p:nvSpPr>
+            <p:cNvPr id="26" name="TextBox 25"/>
+            <p:cNvSpPr txBox="1"/>
+            <p:nvPr/>
+          </p:nvSpPr>
+          <p:spPr>
+            <a:xfrm>
+              <a:off x="971600" y="2915652"/>
+              <a:ext cx="949619" cy="369332"/>
+            </a:xfrm>
+            <a:prstGeom prst="rect">
+              <a:avLst/>
+            </a:prstGeom>
+            <a:noFill/>
+          </p:spPr>
+          <p:txBody>
+            <a:bodyPr wrap="none" rtlCol="0">
+              <a:spAutoFit/>
+            </a:bodyPr>
+            <a:lstStyle/>
+            <a:p>
+              <a:r>
+                <a:rPr lang="en-US" altLang="zh-CN" dirty="0" err="1" smtClean="0">
+                  <a:solidFill>
+                    <a:srgbClr val="FF0000"/>
+                  </a:solidFill>
+                </a:rPr>
+                <a:t>callBlast</a:t>
+              </a:r>
+              <a:endParaRPr lang="zh-CN" altLang="en-US" dirty="0">
+                <a:solidFill>
+                  <a:srgbClr val="FF0000"/>
+                </a:solidFill>
+              </a:endParaRPr>
+            </a:p>
+          </p:txBody>
+        </p:sp>
+        <p:cxnSp>
+          <p:nvCxnSpPr>
+            <p:cNvPr id="28" name="直接箭头连接符 27"/>
+            <p:cNvCxnSpPr>
+              <a:stCxn id="26" idx="3"/>
+            </p:cNvCxnSpPr>
+            <p:nvPr/>
+          </p:nvCxnSpPr>
+          <p:spPr>
+            <a:xfrm>
+              <a:off x="1921219" y="3100318"/>
+              <a:ext cx="445180" cy="0"/>
+            </a:xfrm>
+            <a:prstGeom prst="straightConnector1">
+              <a:avLst/>
+            </a:prstGeom>
+            <a:ln>
+              <a:tailEnd type="arrow"/>
+            </a:ln>
+          </p:spPr>
+          <p:style>
+            <a:lnRef idx="1">
+              <a:schemeClr val="accent1"/>
+            </a:lnRef>
+            <a:fillRef idx="0">
+              <a:schemeClr val="accent1"/>
+            </a:fillRef>
+            <a:effectRef idx="0">
+              <a:schemeClr val="accent1"/>
+            </a:effectRef>
+            <a:fontRef idx="minor">
+              <a:schemeClr val="tx1"/>
+            </a:fontRef>
+          </p:style>
+        </p:cxnSp>
+        <p:cxnSp>
+          <p:nvCxnSpPr>
+            <p:cNvPr id="30" name="直接箭头连接符 29"/>
+            <p:cNvCxnSpPr>
+              <a:stCxn id="8" idx="2"/>
+              <a:endCxn id="11" idx="0"/>
+            </p:cNvCxnSpPr>
+            <p:nvPr/>
+          </p:nvCxnSpPr>
+          <p:spPr>
+            <a:xfrm>
+              <a:off x="2366399" y="3717032"/>
+              <a:ext cx="956486" cy="206732"/>
+            </a:xfrm>
+            <a:prstGeom prst="straightConnector1">
+              <a:avLst/>
+            </a:prstGeom>
+            <a:ln>
+              <a:tailEnd type="arrow"/>
+            </a:ln>
+          </p:spPr>
+          <p:style>
+            <a:lnRef idx="1">
+              <a:schemeClr val="accent1"/>
+            </a:lnRef>
+            <a:fillRef idx="0">
+              <a:schemeClr val="accent1"/>
+            </a:fillRef>
+            <a:effectRef idx="0">
+              <a:schemeClr val="accent1"/>
+            </a:effectRef>
+            <a:fontRef idx="minor">
+              <a:schemeClr val="tx1"/>
+            </a:fontRef>
+          </p:style>
+        </p:cxnSp>
+        <p:sp>
+          <p:nvSpPr>
+            <p:cNvPr id="35" name="TextBox 34"/>
+            <p:cNvSpPr txBox="1"/>
+            <p:nvPr/>
+          </p:nvSpPr>
+          <p:spPr>
+            <a:xfrm>
+              <a:off x="3235355" y="3442997"/>
+              <a:ext cx="964623" cy="369332"/>
+            </a:xfrm>
+            <a:prstGeom prst="rect">
+              <a:avLst/>
+            </a:prstGeom>
+            <a:noFill/>
+          </p:spPr>
+          <p:txBody>
+            <a:bodyPr wrap="none" rtlCol="0">
+              <a:spAutoFit/>
+            </a:bodyPr>
+            <a:lstStyle/>
+            <a:p>
+              <a:r>
+                <a:rPr lang="en-US" altLang="zh-CN" dirty="0" err="1" smtClean="0">
+                  <a:solidFill>
+                    <a:srgbClr val="FF0000"/>
+                  </a:solidFill>
+                </a:rPr>
+                <a:t>STRInfer</a:t>
+              </a:r>
+              <a:endParaRPr lang="zh-CN" altLang="en-US" dirty="0">
+                <a:solidFill>
+                  <a:srgbClr val="FF0000"/>
+                </a:solidFill>
+              </a:endParaRPr>
+            </a:p>
+          </p:txBody>
+        </p:sp>
+        <p:cxnSp>
+          <p:nvCxnSpPr>
+            <p:cNvPr id="42" name="直接箭头连接符 41"/>
+            <p:cNvCxnSpPr>
+              <a:stCxn id="35" idx="1"/>
+            </p:cNvCxnSpPr>
+            <p:nvPr/>
+          </p:nvCxnSpPr>
+          <p:spPr>
+            <a:xfrm flipH="1">
+              <a:off x="2959554" y="3627663"/>
+              <a:ext cx="275801" cy="233385"/>
+            </a:xfrm>
+            <a:prstGeom prst="straightConnector1">
+              <a:avLst/>
+            </a:prstGeom>
+            <a:ln>
+              <a:tailEnd type="arrow"/>
+            </a:ln>
+          </p:spPr>
+          <p:style>
+            <a:lnRef idx="1">
+              <a:schemeClr val="accent1"/>
+            </a:lnRef>
+            <a:fillRef idx="0">
+              <a:schemeClr val="accent1"/>
+            </a:fillRef>
+            <a:effectRef idx="0">
+              <a:schemeClr val="accent1"/>
+            </a:effectRef>
+            <a:fontRef idx="minor">
+              <a:schemeClr val="tx1"/>
+            </a:fontRef>
+          </p:style>
+        </p:cxnSp>
+        <p:cxnSp>
+          <p:nvCxnSpPr>
+            <p:cNvPr id="44" name="直接箭头连接符 43"/>
+            <p:cNvCxnSpPr>
+              <a:stCxn id="8" idx="2"/>
+              <a:endCxn id="10" idx="0"/>
+            </p:cNvCxnSpPr>
+            <p:nvPr/>
+          </p:nvCxnSpPr>
+          <p:spPr>
+            <a:xfrm>
+              <a:off x="2366399" y="3717032"/>
+              <a:ext cx="1002" cy="725580"/>
+            </a:xfrm>
+            <a:prstGeom prst="straightConnector1">
+              <a:avLst/>
+            </a:prstGeom>
+            <a:ln>
+              <a:tailEnd type="arrow"/>
+            </a:ln>
+          </p:spPr>
+          <p:style>
+            <a:lnRef idx="1">
+              <a:schemeClr val="accent1"/>
+            </a:lnRef>
+            <a:fillRef idx="0">
+              <a:schemeClr val="accent1"/>
+            </a:fillRef>
+            <a:effectRef idx="0">
+              <a:schemeClr val="accent1"/>
+            </a:effectRef>
+            <a:fontRef idx="minor">
+              <a:schemeClr val="tx1"/>
+            </a:fontRef>
+          </p:style>
+        </p:cxnSp>
+        <p:sp>
+          <p:nvSpPr>
+            <p:cNvPr id="45" name="TextBox 44"/>
+            <p:cNvSpPr txBox="1"/>
+            <p:nvPr/>
+          </p:nvSpPr>
+          <p:spPr>
+            <a:xfrm>
+              <a:off x="954788" y="3895156"/>
+              <a:ext cx="943272" cy="369332"/>
+            </a:xfrm>
+            <a:prstGeom prst="rect">
+              <a:avLst/>
+            </a:prstGeom>
+            <a:noFill/>
+          </p:spPr>
+          <p:txBody>
+            <a:bodyPr wrap="none" rtlCol="0">
+              <a:spAutoFit/>
+            </a:bodyPr>
+            <a:lstStyle/>
+            <a:p>
+              <a:r>
+                <a:rPr lang="en-US" altLang="zh-CN" dirty="0" err="1" smtClean="0">
+                  <a:solidFill>
+                    <a:srgbClr val="FF0000"/>
+                  </a:solidFill>
+                </a:rPr>
+                <a:t>callfilter</a:t>
+              </a:r>
+              <a:endParaRPr lang="zh-CN" altLang="en-US" dirty="0">
+                <a:solidFill>
+                  <a:srgbClr val="FF0000"/>
+                </a:solidFill>
+              </a:endParaRPr>
+            </a:p>
+          </p:txBody>
+        </p:sp>
+        <p:cxnSp>
+          <p:nvCxnSpPr>
+            <p:cNvPr id="46" name="直接箭头连接符 45"/>
+            <p:cNvCxnSpPr>
+              <a:stCxn id="45" idx="3"/>
+            </p:cNvCxnSpPr>
+            <p:nvPr/>
+          </p:nvCxnSpPr>
+          <p:spPr>
+            <a:xfrm>
+              <a:off x="1898060" y="4079822"/>
+              <a:ext cx="451527" cy="0"/>
+            </a:xfrm>
+            <a:prstGeom prst="straightConnector1">
+              <a:avLst/>
+            </a:prstGeom>
+            <a:ln>
+              <a:tailEnd type="arrow"/>
+            </a:ln>
+          </p:spPr>
+          <p:style>
+            <a:lnRef idx="1">
+              <a:schemeClr val="accent1"/>
+            </a:lnRef>
+            <a:fillRef idx="0">
+              <a:schemeClr val="accent1"/>
+            </a:fillRef>
+            <a:effectRef idx="0">
+              <a:schemeClr val="accent1"/>
+            </a:effectRef>
+            <a:fontRef idx="minor">
+              <a:schemeClr val="tx1"/>
+            </a:fontRef>
+          </p:style>
+        </p:cxnSp>
+        <p:cxnSp>
+          <p:nvCxnSpPr>
+            <p:cNvPr id="56" name="直接箭头连接符 55"/>
+            <p:cNvCxnSpPr>
+              <a:stCxn id="11" idx="1"/>
+            </p:cNvCxnSpPr>
+            <p:nvPr/>
+          </p:nvCxnSpPr>
+          <p:spPr>
+            <a:xfrm flipH="1">
+              <a:off x="2414844" y="4108430"/>
+              <a:ext cx="644988" cy="0"/>
+            </a:xfrm>
+            <a:prstGeom prst="straightConnector1">
+              <a:avLst/>
+            </a:prstGeom>
+            <a:ln>
+              <a:tailEnd type="arrow"/>
+            </a:ln>
+          </p:spPr>
+          <p:style>
+            <a:lnRef idx="1">
+              <a:schemeClr val="accent1"/>
+            </a:lnRef>
+            <a:fillRef idx="0">
+              <a:schemeClr val="accent1"/>
+            </a:fillRef>
+            <a:effectRef idx="0">
+              <a:schemeClr val="accent1"/>
+            </a:effectRef>
+            <a:fontRef idx="minor">
+              <a:schemeClr val="tx1"/>
+            </a:fontRef>
+          </p:style>
+        </p:cxnSp>
+        <p:cxnSp>
+          <p:nvCxnSpPr>
+            <p:cNvPr id="58" name="直接箭头连接符 57"/>
+            <p:cNvCxnSpPr>
+              <a:stCxn id="10" idx="2"/>
+              <a:endCxn id="13" idx="0"/>
+            </p:cNvCxnSpPr>
+            <p:nvPr/>
+          </p:nvCxnSpPr>
+          <p:spPr>
+            <a:xfrm flipH="1">
+              <a:off x="1724888" y="4811944"/>
+              <a:ext cx="642513" cy="489264"/>
+            </a:xfrm>
+            <a:prstGeom prst="straightConnector1">
+              <a:avLst/>
+            </a:prstGeom>
+            <a:ln>
+              <a:tailEnd type="arrow"/>
+            </a:ln>
+          </p:spPr>
+          <p:style>
+            <a:lnRef idx="1">
+              <a:schemeClr val="accent1"/>
+            </a:lnRef>
+            <a:fillRef idx="0">
+              <a:schemeClr val="accent1"/>
+            </a:fillRef>
+            <a:effectRef idx="0">
+              <a:schemeClr val="accent1"/>
+            </a:effectRef>
+            <a:fontRef idx="minor">
+              <a:schemeClr val="tx1"/>
+            </a:fontRef>
+          </p:style>
+        </p:cxnSp>
+        <p:cxnSp>
+          <p:nvCxnSpPr>
+            <p:cNvPr id="60" name="直接箭头连接符 59"/>
+            <p:cNvCxnSpPr>
+              <a:stCxn id="10" idx="2"/>
+              <a:endCxn id="14" idx="0"/>
+            </p:cNvCxnSpPr>
+            <p:nvPr/>
+          </p:nvCxnSpPr>
+          <p:spPr>
+            <a:xfrm>
+              <a:off x="2367401" y="4811944"/>
+              <a:ext cx="592153" cy="489264"/>
+            </a:xfrm>
+            <a:prstGeom prst="straightConnector1">
+              <a:avLst/>
+            </a:prstGeom>
+            <a:ln>
+              <a:tailEnd type="arrow"/>
+            </a:ln>
+          </p:spPr>
+          <p:style>
+            <a:lnRef idx="1">
+              <a:schemeClr val="accent1"/>
+            </a:lnRef>
+            <a:fillRef idx="0">
+              <a:schemeClr val="accent1"/>
+            </a:fillRef>
+            <a:effectRef idx="0">
+              <a:schemeClr val="accent1"/>
+            </a:effectRef>
+            <a:fontRef idx="minor">
+              <a:schemeClr val="tx1"/>
+            </a:fontRef>
+          </p:style>
+        </p:cxnSp>
+        <p:sp>
+          <p:nvSpPr>
+            <p:cNvPr id="61" name="TextBox 60"/>
+            <p:cNvSpPr txBox="1"/>
+            <p:nvPr/>
+          </p:nvSpPr>
+          <p:spPr>
+            <a:xfrm>
+              <a:off x="656825" y="4797152"/>
+              <a:ext cx="827471" cy="369332"/>
+            </a:xfrm>
+            <a:prstGeom prst="rect">
+              <a:avLst/>
+            </a:prstGeom>
+            <a:noFill/>
+          </p:spPr>
+          <p:txBody>
+            <a:bodyPr wrap="none" rtlCol="0">
+              <a:spAutoFit/>
+            </a:bodyPr>
+            <a:lstStyle/>
+            <a:p>
+              <a:r>
+                <a:rPr lang="en-US" altLang="zh-CN" dirty="0" smtClean="0">
+                  <a:solidFill>
+                    <a:srgbClr val="FF0000"/>
+                  </a:solidFill>
+                </a:rPr>
+                <a:t>aligner</a:t>
+              </a:r>
+              <a:endParaRPr lang="zh-CN" altLang="en-US" dirty="0">
+                <a:solidFill>
+                  <a:srgbClr val="FF0000"/>
+                </a:solidFill>
+              </a:endParaRPr>
+            </a:p>
+          </p:txBody>
+        </p:sp>
+        <p:cxnSp>
+          <p:nvCxnSpPr>
+            <p:cNvPr id="62" name="直接箭头连接符 61"/>
+            <p:cNvCxnSpPr>
+              <a:stCxn id="61" idx="3"/>
+            </p:cNvCxnSpPr>
+            <p:nvPr/>
+          </p:nvCxnSpPr>
+          <p:spPr>
+            <a:xfrm>
+              <a:off x="1484296" y="4981818"/>
+              <a:ext cx="567328" cy="0"/>
+            </a:xfrm>
+            <a:prstGeom prst="straightConnector1">
+              <a:avLst/>
+            </a:prstGeom>
+            <a:ln>
+              <a:tailEnd type="arrow"/>
+            </a:ln>
+          </p:spPr>
+          <p:style>
+            <a:lnRef idx="1">
+              <a:schemeClr val="accent1"/>
+            </a:lnRef>
+            <a:fillRef idx="0">
+              <a:schemeClr val="accent1"/>
+            </a:fillRef>
+            <a:effectRef idx="0">
+              <a:schemeClr val="accent1"/>
+            </a:effectRef>
+            <a:fontRef idx="minor">
+              <a:schemeClr val="tx1"/>
+            </a:fontRef>
+          </p:style>
+        </p:cxnSp>
+        <p:sp>
+          <p:nvSpPr>
+            <p:cNvPr id="63" name="TextBox 62"/>
+            <p:cNvSpPr txBox="1"/>
+            <p:nvPr/>
+          </p:nvSpPr>
+          <p:spPr>
+            <a:xfrm>
+              <a:off x="2890195" y="4502578"/>
+              <a:ext cx="1034386" cy="369332"/>
+            </a:xfrm>
+            <a:prstGeom prst="rect">
+              <a:avLst/>
+            </a:prstGeom>
+            <a:noFill/>
+          </p:spPr>
+          <p:txBody>
+            <a:bodyPr wrap="none" rtlCol="0">
+              <a:spAutoFit/>
+            </a:bodyPr>
+            <a:lstStyle/>
+            <a:p>
+              <a:r>
+                <a:rPr lang="en-US" altLang="zh-CN" dirty="0" smtClean="0">
+                  <a:solidFill>
+                    <a:srgbClr val="FF0000"/>
+                  </a:solidFill>
+                </a:rPr>
+                <a:t>Extractor</a:t>
+              </a:r>
+              <a:endParaRPr lang="zh-CN" altLang="en-US" dirty="0">
+                <a:solidFill>
+                  <a:srgbClr val="FF0000"/>
+                </a:solidFill>
+              </a:endParaRPr>
+            </a:p>
+          </p:txBody>
+        </p:sp>
+        <p:cxnSp>
+          <p:nvCxnSpPr>
+            <p:cNvPr id="65" name="直接箭头连接符 64"/>
+            <p:cNvCxnSpPr>
+              <a:stCxn id="63" idx="1"/>
+            </p:cNvCxnSpPr>
+            <p:nvPr/>
+          </p:nvCxnSpPr>
+          <p:spPr>
+            <a:xfrm flipH="1">
+              <a:off x="2626247" y="4687244"/>
+              <a:ext cx="263948" cy="294574"/>
+            </a:xfrm>
+            <a:prstGeom prst="straightConnector1">
+              <a:avLst/>
+            </a:prstGeom>
+            <a:ln>
+              <a:tailEnd type="arrow"/>
+            </a:ln>
+          </p:spPr>
+          <p:style>
+            <a:lnRef idx="1">
+              <a:schemeClr val="accent1"/>
+            </a:lnRef>
+            <a:fillRef idx="0">
+              <a:schemeClr val="accent1"/>
+            </a:fillRef>
+            <a:effectRef idx="0">
+              <a:schemeClr val="accent1"/>
+            </a:effectRef>
+            <a:fontRef idx="minor">
+              <a:schemeClr val="tx1"/>
+            </a:fontRef>
+          </p:style>
+        </p:cxnSp>
+        <p:cxnSp>
+          <p:nvCxnSpPr>
+            <p:cNvPr id="67" name="直接箭头连接符 66"/>
+            <p:cNvCxnSpPr>
+              <a:stCxn id="12" idx="1"/>
+            </p:cNvCxnSpPr>
+            <p:nvPr/>
+          </p:nvCxnSpPr>
+          <p:spPr>
+            <a:xfrm flipH="1">
+              <a:off x="2699792" y="5056576"/>
+              <a:ext cx="435573" cy="0"/>
+            </a:xfrm>
+            <a:prstGeom prst="straightConnector1">
+              <a:avLst/>
+            </a:prstGeom>
+            <a:ln>
+              <a:tailEnd type="arrow"/>
+            </a:ln>
+          </p:spPr>
+          <p:style>
+            <a:lnRef idx="1">
+              <a:schemeClr val="accent1"/>
+            </a:lnRef>
+            <a:fillRef idx="0">
+              <a:schemeClr val="accent1"/>
+            </a:fillRef>
+            <a:effectRef idx="0">
+              <a:schemeClr val="accent1"/>
+            </a:effectRef>
+            <a:fontRef idx="minor">
+              <a:schemeClr val="tx1"/>
+            </a:fontRef>
+          </p:style>
+        </p:cxnSp>
+        <p:cxnSp>
+          <p:nvCxnSpPr>
+            <p:cNvPr id="69" name="直接箭头连接符 68"/>
+            <p:cNvCxnSpPr>
+              <a:stCxn id="13" idx="2"/>
+              <a:endCxn id="15" idx="0"/>
+            </p:cNvCxnSpPr>
+            <p:nvPr/>
+          </p:nvCxnSpPr>
+          <p:spPr>
+            <a:xfrm flipH="1">
+              <a:off x="1724887" y="5670540"/>
+              <a:ext cx="1" cy="382106"/>
+            </a:xfrm>
+            <a:prstGeom prst="straightConnector1">
+              <a:avLst/>
+            </a:prstGeom>
+            <a:ln>
+              <a:tailEnd type="arrow"/>
+            </a:ln>
+          </p:spPr>
+          <p:style>
+            <a:lnRef idx="1">
+              <a:schemeClr val="accent1"/>
+            </a:lnRef>
+            <a:fillRef idx="0">
+              <a:schemeClr val="accent1"/>
+            </a:fillRef>
+            <a:effectRef idx="0">
+              <a:schemeClr val="accent1"/>
+            </a:effectRef>
+            <a:fontRef idx="minor">
+              <a:schemeClr val="tx1"/>
+            </a:fontRef>
+          </p:style>
+        </p:cxnSp>
+        <p:sp>
+          <p:nvSpPr>
+            <p:cNvPr id="70" name="TextBox 69"/>
+            <p:cNvSpPr txBox="1"/>
+            <p:nvPr/>
+          </p:nvSpPr>
+          <p:spPr>
+            <a:xfrm>
+              <a:off x="341634" y="5643381"/>
+              <a:ext cx="1052148" cy="369332"/>
+            </a:xfrm>
+            <a:prstGeom prst="rect">
+              <a:avLst/>
+            </a:prstGeom>
+            <a:noFill/>
+          </p:spPr>
+          <p:txBody>
+            <a:bodyPr wrap="none" rtlCol="0">
+              <a:spAutoFit/>
+            </a:bodyPr>
+            <a:lstStyle/>
+            <a:p>
+              <a:r>
+                <a:rPr lang="en-US" altLang="zh-CN" dirty="0" err="1" smtClean="0">
+                  <a:solidFill>
+                    <a:srgbClr val="FF0000"/>
+                  </a:solidFill>
+                </a:rPr>
+                <a:t>Formater</a:t>
+              </a:r>
+              <a:endParaRPr lang="zh-CN" altLang="en-US" dirty="0">
+                <a:solidFill>
+                  <a:srgbClr val="FF0000"/>
+                </a:solidFill>
+              </a:endParaRPr>
+            </a:p>
+          </p:txBody>
+        </p:sp>
+        <p:cxnSp>
+          <p:nvCxnSpPr>
+            <p:cNvPr id="71" name="直接箭头连接符 70"/>
+            <p:cNvCxnSpPr>
+              <a:stCxn id="70" idx="3"/>
+            </p:cNvCxnSpPr>
+            <p:nvPr/>
+          </p:nvCxnSpPr>
+          <p:spPr>
+            <a:xfrm>
+              <a:off x="1393782" y="5828047"/>
+              <a:ext cx="342651" cy="0"/>
+            </a:xfrm>
+            <a:prstGeom prst="straightConnector1">
+              <a:avLst/>
+            </a:prstGeom>
+            <a:ln>
+              <a:tailEnd type="arrow"/>
+            </a:ln>
+          </p:spPr>
+          <p:style>
+            <a:lnRef idx="1">
+              <a:schemeClr val="accent1"/>
+            </a:lnRef>
+            <a:fillRef idx="0">
+              <a:schemeClr val="accent1"/>
+            </a:fillRef>
+            <a:effectRef idx="0">
+              <a:schemeClr val="accent1"/>
+            </a:effectRef>
+            <a:fontRef idx="minor">
+              <a:schemeClr val="tx1"/>
+            </a:fontRef>
+          </p:style>
+        </p:cxnSp>
+      </p:grpSp>
+    </p:spTree>
+    <p:extLst>
+      <p:ext uri="{BB962C8B-B14F-4D97-AF65-F5344CB8AC3E}">
+        <p14:creationId xmlns:p14="http://schemas.microsoft.com/office/powerpoint/2010/main" val="330962709"/>
       </p:ext>
     </p:extLst>
   </p:cSld>

</xml_diff>